<commit_message>
fix documentation and ppt
</commit_message>
<xml_diff>
--- a/CV Management_Presentation.pptx
+++ b/CV Management_Presentation.pptx
@@ -4406,7 +4406,11 @@
             </a:pPr>
             <a:r>
               <a:rPr lang="en-US" dirty="0" smtClean="0"/>
-              <a:t> Angular</a:t>
+              <a:t> </a:t>
+            </a:r>
+            <a:r>
+              <a:rPr lang="en-US" dirty="0" smtClean="0"/>
+              <a:t>Angular 6 </a:t>
             </a:r>
           </a:p>
           <a:p>
@@ -4415,10 +4419,20 @@
               <a:buChar char="v"/>
             </a:pPr>
             <a:r>
+              <a:rPr lang="en-US" smtClean="0"/>
+              <a:t>Angular CLI</a:t>
+            </a:r>
+            <a:endParaRPr lang="en-US" dirty="0" smtClean="0"/>
+          </a:p>
+          <a:p>
+            <a:pPr>
+              <a:buFont typeface="Wingdings" pitchFamily="2" charset="2"/>
+              <a:buChar char="v"/>
+            </a:pPr>
+            <a:r>
               <a:rPr lang="en-US" dirty="0" smtClean="0"/>
               <a:t>Type Script</a:t>
             </a:r>
-            <a:endParaRPr lang="en-US" dirty="0" smtClean="0"/>
           </a:p>
           <a:p>
             <a:pPr>
@@ -4738,11 +4752,7 @@
             </a:r>
             <a:r>
               <a:rPr lang="bg-BG" dirty="0" smtClean="0"/>
-              <a:t>за извличане на публикациите, както и за управление на </a:t>
-            </a:r>
-            <a:r>
-              <a:rPr lang="bg-BG" dirty="0" smtClean="0"/>
-              <a:t>потребителите</a:t>
+              <a:t>за извличане на публикациите, както и за управление на потребителите</a:t>
             </a:r>
             <a:r>
               <a:rPr lang="en-US" dirty="0" smtClean="0"/>
@@ -4756,7 +4766,6 @@
               <a:rPr lang="en-US" dirty="0" smtClean="0"/>
               <a:t>Spring Boot Framework.</a:t>
             </a:r>
-            <a:endParaRPr lang="en-US" dirty="0" smtClean="0"/>
           </a:p>
           <a:p>
             <a:pPr>
@@ -5070,23 +5079,13 @@
             <a:pPr lvl="0"/>
             <a:r>
               <a:rPr lang="en-US" dirty="0" smtClean="0"/>
-              <a:t>Bootstrap </a:t>
-            </a:r>
-            <a:r>
-              <a:rPr lang="en-US" dirty="0" smtClean="0"/>
-              <a:t>- </a:t>
+              <a:t>Bootstrap - </a:t>
             </a:r>
             <a:r>
               <a:rPr lang="en-US" u="sng" dirty="0" smtClean="0">
                 <a:hlinkClick r:id="rId2"/>
               </a:rPr>
-              <a:t>http://getbootstrap.com</a:t>
-            </a:r>
-            <a:r>
-              <a:rPr lang="en-US" u="sng" dirty="0" smtClean="0">
-                <a:hlinkClick r:id="rId2"/>
-              </a:rPr>
-              <a:t>/</a:t>
+              <a:t>http://getbootstrap.com/</a:t>
             </a:r>
             <a:endParaRPr lang="en-US" u="sng" dirty="0" smtClean="0"/>
           </a:p>
@@ -5099,13 +5098,7 @@
               <a:rPr lang="en-US" u="sng" dirty="0" smtClean="0">
                 <a:hlinkClick r:id="rId3"/>
               </a:rPr>
-              <a:t>https://</a:t>
-            </a:r>
-            <a:r>
-              <a:rPr lang="en-US" u="sng" dirty="0" smtClean="0">
-                <a:hlinkClick r:id="rId3"/>
-              </a:rPr>
-              <a:t>angular.io/docs</a:t>
+              <a:t>https://angular.io/docs</a:t>
             </a:r>
             <a:endParaRPr lang="bg-BG" dirty="0" smtClean="0"/>
           </a:p>
@@ -5155,11 +5148,7 @@
             <a:pPr lvl="0"/>
             <a:r>
               <a:rPr lang="en-US" dirty="0" smtClean="0"/>
-              <a:t>Material </a:t>
-            </a:r>
-            <a:r>
-              <a:rPr lang="en-US" dirty="0" smtClean="0"/>
-              <a:t>Design for Bootstrap - </a:t>
+              <a:t>Material Design for Bootstrap - </a:t>
             </a:r>
             <a:r>
               <a:rPr lang="bg-BG" u="sng" dirty="0" smtClean="0">

</xml_diff>